<commit_message>
Indendation and PPT Issue #166
</commit_message>
<xml_diff>
--- a/app/www/CLIAR_template.pptx
+++ b/app/www/CLIAR_template.pptx
@@ -14,7 +14,7 @@
     <p:sldId id="2141411688" r:id="rId8"/>
     <p:sldId id="2141411684" r:id="rId9"/>
     <p:sldId id="2141411710" r:id="rId10"/>
-    <p:sldId id="911" r:id="rId11"/>
+    <p:sldId id="2141411712" r:id="rId11"/>
     <p:sldId id="1022" r:id="rId12"/>
     <p:sldId id="2141411711" r:id="rId13"/>
   </p:sldIdLst>
@@ -527,7 +527,7 @@
           <a:p>
             <a:fld id="{9EFFC45B-4969-4982-B259-08F17AE2E29E}" type="datetimeFigureOut">
               <a:rPr lang="en-US" smtClean="0"/>
-              <a:t>11/9/23</a:t>
+              <a:t>11/20/23</a:t>
             </a:fld>
             <a:endParaRPr lang="en-US"/>
           </a:p>
@@ -3798,10 +3798,10 @@
       </p:sp>
       <p:pic>
         <p:nvPicPr>
-          <p:cNvPr id="7" name="Picture 6" descr="A colorful circle with text&#10;&#10;Description automatically generated with medium confidence">
+          <p:cNvPr id="6" name="Picture 5">
             <a:extLst>
               <a:ext uri="{FF2B5EF4-FFF2-40B4-BE49-F238E27FC236}">
-                <a16:creationId xmlns:a16="http://schemas.microsoft.com/office/drawing/2014/main" id="{9225BB87-7CCA-6E10-DBB7-828C284199E4}"/>
+                <a16:creationId xmlns:a16="http://schemas.microsoft.com/office/drawing/2014/main" id="{3B81A771-F787-B541-9533-7EE210EEAE52}"/>
               </a:ext>
             </a:extLst>
           </p:cNvPr>
@@ -3811,24 +3811,26 @@
           <p:nvPr/>
         </p:nvPicPr>
         <p:blipFill rotWithShape="1">
-          <a:blip r:embed="rId3">
-            <a:extLst>
-              <a:ext uri="{28A0092B-C50C-407E-A947-70E740481C1C}">
-                <a14:useLocalDpi xmlns:a14="http://schemas.microsoft.com/office/drawing/2010/main" val="0"/>
-              </a:ext>
-            </a:extLst>
-          </a:blip>
-          <a:srcRect l="25276" t="5324" r="22565" b="7543"/>
+          <a:blip r:embed="rId3"/>
+          <a:srcRect l="484" r="2101" b="3448"/>
           <a:stretch/>
         </p:blipFill>
-        <p:spPr>
+        <p:spPr bwMode="auto">
           <a:xfrm>
-            <a:off x="6611292" y="695412"/>
-            <a:ext cx="5435844" cy="5107903"/>
+            <a:off x="7109863" y="752608"/>
+            <a:ext cx="4523337" cy="4830507"/>
           </a:xfrm>
           <a:prstGeom prst="rect">
             <a:avLst/>
           </a:prstGeom>
+          <a:ln>
+            <a:noFill/>
+          </a:ln>
+          <a:extLst>
+            <a:ext uri="{53640926-AAD7-44D8-BBD7-CCE9431645EC}">
+              <a14:shadowObscured xmlns:a14="http://schemas.microsoft.com/office/drawing/2010/main"/>
+            </a:ext>
+          </a:extLst>
         </p:spPr>
       </p:pic>
     </p:spTree>
@@ -5078,14 +5080,6 @@
 <file path=ppt/slides/slide7.xml><?xml version="1.0" encoding="utf-8"?>
 <p:sld xmlns:a="http://schemas.openxmlformats.org/drawingml/2006/main" xmlns:r="http://schemas.openxmlformats.org/officeDocument/2006/relationships" xmlns:p="http://schemas.openxmlformats.org/presentationml/2006/main">
   <p:cSld>
-    <p:bg>
-      <p:bgPr>
-        <a:solidFill>
-          <a:schemeClr val="bg1"/>
-        </a:solidFill>
-        <a:effectLst/>
-      </p:bgPr>
-    </p:bg>
     <p:spTree>
       <p:nvGrpSpPr>
         <p:cNvPr id="1" name=""/>
@@ -5102,7 +5096,7 @@
       </p:grpSpPr>
       <p:sp>
         <p:nvSpPr>
-          <p:cNvPr id="26" name="Text Placeholder 3">
+          <p:cNvPr id="2" name="Text Placeholder 3">
             <a:extLst>
               <a:ext uri="{FF2B5EF4-FFF2-40B4-BE49-F238E27FC236}">
                 <a16:creationId xmlns:a16="http://schemas.microsoft.com/office/drawing/2014/main" id="{F0921CC9-17CA-49D7-8610-D064CEC145C1}"/>
@@ -5116,8 +5110,8 @@
         </p:nvSpPr>
         <p:spPr>
           <a:xfrm>
-            <a:off x="3255336" y="838157"/>
-            <a:ext cx="8498839" cy="2005638"/>
+            <a:off x="3255345" y="1167591"/>
+            <a:ext cx="8498839" cy="3776600"/>
           </a:xfrm>
           <a:prstGeom prst="rect">
             <a:avLst/>
@@ -5305,7 +5299,7 @@
               <a:buChar char="•"/>
             </a:pPr>
             <a:r>
-              <a:rPr lang="en-US" sz="2000">
+              <a:rPr lang="en-US" sz="2000" dirty="0">
                 <a:latin typeface="+mj-lt"/>
                 <a:ea typeface="+mn-ea"/>
                 <a:cs typeface="Calibri Light" panose="020F0302020204030204" pitchFamily="34" charset="0"/>
@@ -5313,7 +5307,7 @@
               <a:t>Indicators are standardized using the </a:t>
             </a:r>
             <a:r>
-              <a:rPr lang="en-US" sz="2000" b="1">
+              <a:rPr lang="en-US" sz="2000" b="1" dirty="0">
                 <a:latin typeface="+mj-lt"/>
                 <a:ea typeface="+mn-ea"/>
                 <a:cs typeface="Calibri" panose="020F0502020204030204" pitchFamily="34" charset="0"/>
@@ -5321,7 +5315,7 @@
               <a:t>“closeness to frontier”</a:t>
             </a:r>
             <a:r>
-              <a:rPr lang="en-US" sz="2000">
+              <a:rPr lang="en-US" sz="2000" dirty="0">
                 <a:latin typeface="+mj-lt"/>
                 <a:ea typeface="+mn-ea"/>
                 <a:cs typeface="Calibri Light" panose="020F0302020204030204" pitchFamily="34" charset="0"/>
@@ -5329,7 +5323,7 @@
               <a:t> (CTF) transformation. The CTF score captures the gap between a country’s performance and the world’s best performer</a:t>
             </a:r>
             <a:r>
-              <a:rPr lang="en-US" sz="2000">
+              <a:rPr lang="en-US" sz="2000" dirty="0">
                 <a:solidFill>
                   <a:schemeClr val="tx2"/>
                 </a:solidFill>
@@ -5337,7 +5331,7 @@
                 <a:ea typeface="+mn-ea"/>
                 <a:cs typeface="Calibri Light" panose="020F0302020204030204" pitchFamily="34" charset="0"/>
               </a:rPr>
-              <a:t>. </a:t>
+              <a:t>. [Absolute measure]</a:t>
             </a:r>
           </a:p>
           <a:p>
@@ -5348,7 +5342,7 @@
               <a:buFont typeface="Arial" panose="020B0604020202020204" pitchFamily="34" charset="0"/>
               <a:buChar char="•"/>
             </a:pPr>
-            <a:endParaRPr lang="en-US" sz="2000">
+            <a:endParaRPr lang="en-US" sz="2000" dirty="0">
               <a:latin typeface="+mj-lt"/>
               <a:ea typeface="+mn-ea"/>
               <a:cs typeface="Calibri Light" panose="020F0302020204030204" pitchFamily="34" charset="0"/>
@@ -5363,7 +5357,7 @@
               <a:buChar char="•"/>
             </a:pPr>
             <a:r>
-              <a:rPr lang="en-US" sz="2000" b="1">
+              <a:rPr lang="en-US" sz="2000" b="1" dirty="0">
                 <a:solidFill>
                   <a:schemeClr val="tx2"/>
                 </a:solidFill>
@@ -5374,7 +5368,7 @@
               <a:t>Percentile (distribution) analysis </a:t>
             </a:r>
             <a:r>
-              <a:rPr lang="en-US" sz="2000">
+              <a:rPr lang="en-US" sz="2000" dirty="0">
                 <a:latin typeface="+mj-lt"/>
                 <a:ea typeface="+mn-ea"/>
                 <a:cs typeface="Calibri Light" panose="020F0302020204030204" pitchFamily="34" charset="0"/>
@@ -5382,7 +5376,7 @@
               <a:t>is then used to capture the country’s performance </a:t>
             </a:r>
             <a:r>
-              <a:rPr lang="en-US" sz="2000" b="1">
+              <a:rPr lang="en-US" sz="2000" b="1" dirty="0">
                 <a:latin typeface="+mj-lt"/>
                 <a:ea typeface="+mn-ea"/>
                 <a:cs typeface="Calibri Light" panose="020F0302020204030204" pitchFamily="34" charset="0"/>
@@ -5390,14 +5384,104 @@
               <a:t>relative to a set of comparators countries </a:t>
             </a:r>
             <a:r>
-              <a:rPr lang="en-US" sz="2000">
+              <a:rPr lang="en-US" sz="2000" dirty="0">
                 <a:latin typeface="+mj-lt"/>
                 <a:ea typeface="+mn-ea"/>
                 <a:cs typeface="Calibri Light" panose="020F0302020204030204" pitchFamily="34" charset="0"/>
               </a:rPr>
-              <a:t>(selected by the team)</a:t>
-            </a:r>
-            <a:endParaRPr lang="en-US" sz="2000">
+              <a:t>(selected by the team) [Relative measure]</a:t>
+            </a:r>
+          </a:p>
+          <a:p>
+            <a:pPr marL="285750" indent="-228600">
+              <a:lnSpc>
+                <a:spcPct val="90000"/>
+              </a:lnSpc>
+              <a:buFont typeface="Arial" panose="020B0604020202020204" pitchFamily="34" charset="0"/>
+              <a:buChar char="•"/>
+            </a:pPr>
+            <a:endParaRPr lang="en-US" sz="2000" dirty="0">
+              <a:solidFill>
+                <a:schemeClr val="tx2"/>
+              </a:solidFill>
+              <a:latin typeface="+mj-lt"/>
+              <a:ea typeface="+mn-ea"/>
+              <a:cs typeface="Calibri Light" panose="020F0302020204030204" pitchFamily="34" charset="0"/>
+            </a:endParaRPr>
+          </a:p>
+          <a:p>
+            <a:pPr marL="285750" indent="-228600">
+              <a:lnSpc>
+                <a:spcPct val="90000"/>
+              </a:lnSpc>
+              <a:buFont typeface="Arial" panose="020B0604020202020204" pitchFamily="34" charset="0"/>
+              <a:buChar char="•"/>
+            </a:pPr>
+            <a:r>
+              <a:rPr lang="en-US" sz="2000" u="sng" dirty="0">
+                <a:solidFill>
+                  <a:schemeClr val="tx2"/>
+                </a:solidFill>
+                <a:latin typeface="+mj-lt"/>
+                <a:ea typeface="+mn-ea"/>
+                <a:cs typeface="Calibri" panose="020F0502020204030204" pitchFamily="34" charset="0"/>
+              </a:rPr>
+              <a:t>Two types of analysis</a:t>
+            </a:r>
+            <a:r>
+              <a:rPr lang="en-US" sz="2000" b="1" dirty="0">
+                <a:solidFill>
+                  <a:schemeClr val="tx2"/>
+                </a:solidFill>
+                <a:latin typeface="+mj-lt"/>
+                <a:ea typeface="+mn-ea"/>
+                <a:cs typeface="Calibri" panose="020F0502020204030204" pitchFamily="34" charset="0"/>
+              </a:rPr>
+              <a:t>: Static </a:t>
+            </a:r>
+            <a:r>
+              <a:rPr lang="en-US" sz="2000" dirty="0">
+                <a:solidFill>
+                  <a:schemeClr val="tx2"/>
+                </a:solidFill>
+                <a:latin typeface="+mj-lt"/>
+                <a:ea typeface="+mn-ea"/>
+                <a:cs typeface="Calibri" panose="020F0502020204030204" pitchFamily="34" charset="0"/>
+              </a:rPr>
+              <a:t>(core, snapshot 5-year avg.) &amp; </a:t>
+            </a:r>
+            <a:r>
+              <a:rPr lang="en-US" sz="2000" b="1" dirty="0">
+                <a:solidFill>
+                  <a:schemeClr val="tx2"/>
+                </a:solidFill>
+                <a:latin typeface="+mj-lt"/>
+                <a:ea typeface="+mn-ea"/>
+                <a:cs typeface="Calibri" panose="020F0502020204030204" pitchFamily="34" charset="0"/>
+              </a:rPr>
+              <a:t>Dynamic </a:t>
+            </a:r>
+            <a:r>
+              <a:rPr lang="en-US" sz="2000" dirty="0">
+                <a:solidFill>
+                  <a:schemeClr val="tx2"/>
+                </a:solidFill>
+                <a:latin typeface="+mj-lt"/>
+                <a:ea typeface="+mn-ea"/>
+                <a:cs typeface="Calibri" panose="020F0502020204030204" pitchFamily="34" charset="0"/>
+              </a:rPr>
+              <a:t>(trends)</a:t>
+            </a:r>
+          </a:p>
+          <a:p>
+            <a:pPr marL="285750" indent="-228600">
+              <a:lnSpc>
+                <a:spcPct val="90000"/>
+              </a:lnSpc>
+              <a:buFont typeface="Arial" panose="020B0604020202020204" pitchFamily="34" charset="0"/>
+              <a:buChar char="•"/>
+            </a:pPr>
+            <a:endParaRPr lang="en-US" sz="2000" dirty="0">
               <a:solidFill>
                 <a:schemeClr val="tx2"/>
               </a:solidFill>
@@ -5414,7 +5498,7 @@
               <a:buFont typeface="Arial" panose="020B0604020202020204" pitchFamily="34" charset="0"/>
               <a:buChar char="•"/>
             </a:pPr>
-            <a:endParaRPr lang="en-US" sz="2000" b="1">
+            <a:endParaRPr lang="en-US" sz="2000" b="1" dirty="0">
               <a:solidFill>
                 <a:schemeClr val="tx2"/>
               </a:solidFill>
@@ -5427,7 +5511,7 @@
       </p:sp>
       <p:sp>
         <p:nvSpPr>
-          <p:cNvPr id="2" name="Slide Number Placeholder 1">
+          <p:cNvPr id="3" name="Slide Number Placeholder 1">
             <a:extLst>
               <a:ext uri="{FF2B5EF4-FFF2-40B4-BE49-F238E27FC236}">
                 <a16:creationId xmlns:a16="http://schemas.microsoft.com/office/drawing/2014/main" id="{0035159D-3587-FA4B-A073-B4CB440DED99}"/>
@@ -5461,7 +5545,7 @@
       </p:sp>
       <p:sp>
         <p:nvSpPr>
-          <p:cNvPr id="6" name="Title 5">
+          <p:cNvPr id="4" name="Title 5">
             <a:extLst>
               <a:ext uri="{FF2B5EF4-FFF2-40B4-BE49-F238E27FC236}">
                 <a16:creationId xmlns:a16="http://schemas.microsoft.com/office/drawing/2014/main" id="{A17E4AFE-AAAE-D348-A1F0-E1761719A80E}"/>
@@ -5494,7 +5578,7 @@
       </p:sp>
       <p:sp>
         <p:nvSpPr>
-          <p:cNvPr id="55" name="Title 4">
+          <p:cNvPr id="5" name="Title 4">
             <a:extLst>
               <a:ext uri="{FF2B5EF4-FFF2-40B4-BE49-F238E27FC236}">
                 <a16:creationId xmlns:a16="http://schemas.microsoft.com/office/drawing/2014/main" id="{488836F8-2423-AA47-9395-1F7630F7BFB4}"/>
@@ -5564,7 +5648,7 @@
       </p:sp>
       <p:cxnSp>
         <p:nvCxnSpPr>
-          <p:cNvPr id="57" name="Straight Connector 56">
+          <p:cNvPr id="6" name="Straight Connector 56">
             <a:extLst>
               <a:ext uri="{FF2B5EF4-FFF2-40B4-BE49-F238E27FC236}">
                 <a16:creationId xmlns:a16="http://schemas.microsoft.com/office/drawing/2014/main" id="{9F73AC63-125C-0643-8962-182F77985FE5}"/>
@@ -5605,337 +5689,10 @@
           </a:fontRef>
         </p:style>
       </p:cxnSp>
-      <p:pic>
-        <p:nvPicPr>
-          <p:cNvPr id="5" name="Picture 4" descr="Chart&#10;&#10;Description automatically generated with low confidence">
-            <a:extLst>
-              <a:ext uri="{FF2B5EF4-FFF2-40B4-BE49-F238E27FC236}">
-                <a16:creationId xmlns:a16="http://schemas.microsoft.com/office/drawing/2014/main" id="{B8512F2B-98D5-4E47-A894-EFC5D78ADC26}"/>
-              </a:ext>
-            </a:extLst>
-          </p:cNvPr>
-          <p:cNvPicPr>
-            <a:picLocks noChangeAspect="1"/>
-          </p:cNvPicPr>
-          <p:nvPr/>
-        </p:nvPicPr>
-        <p:blipFill>
-          <a:blip r:embed="rId3">
-            <a:extLst>
-              <a:ext uri="{28A0092B-C50C-407E-A947-70E740481C1C}">
-                <a14:useLocalDpi xmlns:a14="http://schemas.microsoft.com/office/drawing/2010/main" val="0"/>
-              </a:ext>
-            </a:extLst>
-          </a:blip>
-          <a:stretch>
-            <a:fillRect/>
-          </a:stretch>
-        </p:blipFill>
-        <p:spPr>
-          <a:xfrm>
-            <a:off x="4499303" y="2836713"/>
-            <a:ext cx="6010904" cy="1942691"/>
-          </a:xfrm>
-          <a:prstGeom prst="rect">
-            <a:avLst/>
-          </a:prstGeom>
-        </p:spPr>
-      </p:pic>
-      <p:sp>
-        <p:nvSpPr>
-          <p:cNvPr id="3" name="Text Placeholder 3">
-            <a:extLst>
-              <a:ext uri="{FF2B5EF4-FFF2-40B4-BE49-F238E27FC236}">
-                <a16:creationId xmlns:a16="http://schemas.microsoft.com/office/drawing/2014/main" id="{ED123EFB-AC07-5926-8EB0-1A736804DD56}"/>
-              </a:ext>
-            </a:extLst>
-          </p:cNvPr>
-          <p:cNvSpPr txBox="1">
-            <a:spLocks/>
-          </p:cNvSpPr>
-          <p:nvPr/>
-        </p:nvSpPr>
-        <p:spPr>
-          <a:xfrm>
-            <a:off x="3345814" y="4882556"/>
-            <a:ext cx="8408370" cy="776426"/>
-          </a:xfrm>
-          <a:prstGeom prst="rect">
-            <a:avLst/>
-          </a:prstGeom>
-        </p:spPr>
-        <p:txBody>
-          <a:bodyPr vert="horz" lIns="91440" tIns="45720" rIns="91440" bIns="45720" rtlCol="0" anchor="ctr">
-            <a:normAutofit/>
-          </a:bodyPr>
-          <a:lstStyle>
-            <a:lvl1pPr marL="342900" indent="-342900" algn="l" rtl="0" eaLnBrk="1" fontAlgn="base" hangingPunct="1">
-              <a:lnSpc>
-                <a:spcPct val="115000"/>
-              </a:lnSpc>
-              <a:spcBef>
-                <a:spcPct val="20000"/>
-              </a:spcBef>
-              <a:spcAft>
-                <a:spcPct val="0"/>
-              </a:spcAft>
-              <a:buClr>
-                <a:srgbClr val="00783C"/>
-              </a:buClr>
-              <a:defRPr>
-                <a:solidFill>
-                  <a:schemeClr val="tx1"/>
-                </a:solidFill>
-                <a:latin typeface="+mn-lt"/>
-                <a:ea typeface="MS PGothic" pitchFamily="34" charset="-128"/>
-                <a:cs typeface="+mn-cs"/>
-              </a:defRPr>
-            </a:lvl1pPr>
-            <a:lvl2pPr marL="742950" indent="-285750" algn="l" rtl="0" eaLnBrk="1" fontAlgn="base" hangingPunct="1">
-              <a:spcBef>
-                <a:spcPct val="20000"/>
-              </a:spcBef>
-              <a:spcAft>
-                <a:spcPct val="0"/>
-              </a:spcAft>
-              <a:buClr>
-                <a:srgbClr val="00783C"/>
-              </a:buClr>
-              <a:buFont typeface="Wingdings" pitchFamily="2" charset="2"/>
-              <a:defRPr>
-                <a:solidFill>
-                  <a:schemeClr val="tx1"/>
-                </a:solidFill>
-                <a:latin typeface="+mn-lt"/>
-                <a:ea typeface="MS PGothic" pitchFamily="34" charset="-128"/>
-              </a:defRPr>
-            </a:lvl2pPr>
-            <a:lvl3pPr marL="4763" indent="909638" algn="l" rtl="0" eaLnBrk="1" fontAlgn="base" hangingPunct="1">
-              <a:spcBef>
-                <a:spcPct val="20000"/>
-              </a:spcBef>
-              <a:spcAft>
-                <a:spcPct val="0"/>
-              </a:spcAft>
-              <a:buClr>
-                <a:srgbClr val="00783C"/>
-              </a:buClr>
-              <a:defRPr>
-                <a:solidFill>
-                  <a:schemeClr val="tx1"/>
-                </a:solidFill>
-                <a:latin typeface="+mn-lt"/>
-                <a:ea typeface="MS PGothic" pitchFamily="34" charset="-128"/>
-              </a:defRPr>
-            </a:lvl3pPr>
-            <a:lvl4pPr marL="1600200" indent="-228600" algn="l" rtl="0" eaLnBrk="1" fontAlgn="base" hangingPunct="1">
-              <a:spcBef>
-                <a:spcPct val="20000"/>
-              </a:spcBef>
-              <a:spcAft>
-                <a:spcPct val="0"/>
-              </a:spcAft>
-              <a:buClr>
-                <a:srgbClr val="00783C"/>
-              </a:buClr>
-              <a:defRPr>
-                <a:solidFill>
-                  <a:schemeClr val="tx1"/>
-                </a:solidFill>
-                <a:latin typeface="+mn-lt"/>
-                <a:ea typeface="MS PGothic" pitchFamily="34" charset="-128"/>
-              </a:defRPr>
-            </a:lvl4pPr>
-            <a:lvl5pPr marL="2057400" indent="-228600" algn="l" rtl="0" eaLnBrk="1" fontAlgn="base" hangingPunct="1">
-              <a:spcBef>
-                <a:spcPct val="20000"/>
-              </a:spcBef>
-              <a:spcAft>
-                <a:spcPct val="0"/>
-              </a:spcAft>
-              <a:buClr>
-                <a:srgbClr val="00783C"/>
-              </a:buClr>
-              <a:defRPr>
-                <a:solidFill>
-                  <a:schemeClr val="tx1"/>
-                </a:solidFill>
-                <a:latin typeface="+mn-lt"/>
-                <a:ea typeface="MS PGothic" pitchFamily="34" charset="-128"/>
-              </a:defRPr>
-            </a:lvl5pPr>
-            <a:lvl6pPr marL="2514600" indent="-228600" algn="l" rtl="0" eaLnBrk="1" fontAlgn="base" hangingPunct="1">
-              <a:spcBef>
-                <a:spcPct val="20000"/>
-              </a:spcBef>
-              <a:spcAft>
-                <a:spcPct val="0"/>
-              </a:spcAft>
-              <a:buClr>
-                <a:srgbClr val="00783C"/>
-              </a:buClr>
-              <a:buChar char="»"/>
-              <a:defRPr sz="1600">
-                <a:solidFill>
-                  <a:schemeClr val="tx1"/>
-                </a:solidFill>
-                <a:latin typeface="+mn-lt"/>
-              </a:defRPr>
-            </a:lvl6pPr>
-            <a:lvl7pPr marL="2971800" indent="-228600" algn="l" rtl="0" eaLnBrk="1" fontAlgn="base" hangingPunct="1">
-              <a:spcBef>
-                <a:spcPct val="20000"/>
-              </a:spcBef>
-              <a:spcAft>
-                <a:spcPct val="0"/>
-              </a:spcAft>
-              <a:buClr>
-                <a:srgbClr val="00783C"/>
-              </a:buClr>
-              <a:buChar char="»"/>
-              <a:defRPr sz="1600">
-                <a:solidFill>
-                  <a:schemeClr val="tx1"/>
-                </a:solidFill>
-                <a:latin typeface="+mn-lt"/>
-              </a:defRPr>
-            </a:lvl7pPr>
-            <a:lvl8pPr marL="3429000" indent="-228600" algn="l" rtl="0" eaLnBrk="1" fontAlgn="base" hangingPunct="1">
-              <a:spcBef>
-                <a:spcPct val="20000"/>
-              </a:spcBef>
-              <a:spcAft>
-                <a:spcPct val="0"/>
-              </a:spcAft>
-              <a:buClr>
-                <a:srgbClr val="00783C"/>
-              </a:buClr>
-              <a:buChar char="»"/>
-              <a:defRPr sz="1600">
-                <a:solidFill>
-                  <a:schemeClr val="tx1"/>
-                </a:solidFill>
-                <a:latin typeface="+mn-lt"/>
-              </a:defRPr>
-            </a:lvl8pPr>
-            <a:lvl9pPr marL="3886200" indent="-228600" algn="l" rtl="0" eaLnBrk="1" fontAlgn="base" hangingPunct="1">
-              <a:spcBef>
-                <a:spcPct val="20000"/>
-              </a:spcBef>
-              <a:spcAft>
-                <a:spcPct val="0"/>
-              </a:spcAft>
-              <a:buClr>
-                <a:srgbClr val="00783C"/>
-              </a:buClr>
-              <a:buChar char="»"/>
-              <a:defRPr sz="1600">
-                <a:solidFill>
-                  <a:schemeClr val="tx1"/>
-                </a:solidFill>
-                <a:latin typeface="+mn-lt"/>
-              </a:defRPr>
-            </a:lvl9pPr>
-          </a:lstStyle>
-          <a:p>
-            <a:pPr marL="57150" indent="0">
-              <a:lnSpc>
-                <a:spcPct val="90000"/>
-              </a:lnSpc>
-            </a:pPr>
-            <a:endParaRPr lang="en-US" sz="2000">
-              <a:latin typeface="+mj-lt"/>
-              <a:ea typeface="+mn-ea"/>
-              <a:cs typeface="Calibri Light" panose="020F0302020204030204" pitchFamily="34" charset="0"/>
-            </a:endParaRPr>
-          </a:p>
-          <a:p>
-            <a:pPr marL="285750" indent="-228600">
-              <a:lnSpc>
-                <a:spcPct val="90000"/>
-              </a:lnSpc>
-              <a:buFont typeface="Arial" panose="020B0604020202020204" pitchFamily="34" charset="0"/>
-              <a:buChar char="•"/>
-            </a:pPr>
-            <a:r>
-              <a:rPr lang="en-US" sz="2000" u="sng">
-                <a:solidFill>
-                  <a:schemeClr val="tx2"/>
-                </a:solidFill>
-                <a:latin typeface="+mj-lt"/>
-                <a:ea typeface="+mn-ea"/>
-                <a:cs typeface="Calibri" panose="020F0502020204030204" pitchFamily="34" charset="0"/>
-              </a:rPr>
-              <a:t>Two types of analysis</a:t>
-            </a:r>
-            <a:r>
-              <a:rPr lang="en-US" sz="2000" b="1">
-                <a:solidFill>
-                  <a:schemeClr val="tx2"/>
-                </a:solidFill>
-                <a:latin typeface="+mj-lt"/>
-                <a:ea typeface="+mn-ea"/>
-                <a:cs typeface="Calibri" panose="020F0502020204030204" pitchFamily="34" charset="0"/>
-              </a:rPr>
-              <a:t>: Static </a:t>
-            </a:r>
-            <a:r>
-              <a:rPr lang="en-US" sz="2000">
-                <a:solidFill>
-                  <a:schemeClr val="tx2"/>
-                </a:solidFill>
-                <a:latin typeface="+mj-lt"/>
-                <a:ea typeface="+mn-ea"/>
-                <a:cs typeface="Calibri" panose="020F0502020204030204" pitchFamily="34" charset="0"/>
-              </a:rPr>
-              <a:t>(core, snapshot 5-year avg.) &amp; </a:t>
-            </a:r>
-            <a:r>
-              <a:rPr lang="en-US" sz="2000" b="1">
-                <a:solidFill>
-                  <a:schemeClr val="tx2"/>
-                </a:solidFill>
-                <a:latin typeface="+mj-lt"/>
-                <a:ea typeface="+mn-ea"/>
-                <a:cs typeface="Calibri" panose="020F0502020204030204" pitchFamily="34" charset="0"/>
-              </a:rPr>
-              <a:t>Dynamic </a:t>
-            </a:r>
-            <a:r>
-              <a:rPr lang="en-US" sz="2000">
-                <a:solidFill>
-                  <a:schemeClr val="tx2"/>
-                </a:solidFill>
-                <a:latin typeface="+mj-lt"/>
-                <a:ea typeface="+mn-ea"/>
-                <a:cs typeface="Calibri" panose="020F0502020204030204" pitchFamily="34" charset="0"/>
-              </a:rPr>
-              <a:t>(trends)</a:t>
-            </a:r>
-          </a:p>
-          <a:p>
-            <a:pPr marL="285750" indent="-228600">
-              <a:lnSpc>
-                <a:spcPct val="90000"/>
-              </a:lnSpc>
-              <a:buFont typeface="Arial" panose="020B0604020202020204" pitchFamily="34" charset="0"/>
-              <a:buChar char="•"/>
-            </a:pPr>
-            <a:endParaRPr lang="en-US" sz="2000" b="1">
-              <a:solidFill>
-                <a:schemeClr val="tx2"/>
-              </a:solidFill>
-              <a:latin typeface="+mj-lt"/>
-              <a:ea typeface="+mn-ea"/>
-              <a:cs typeface="Calibri" panose="020F0502020204030204" pitchFamily="34" charset="0"/>
-            </a:endParaRPr>
-          </a:p>
-        </p:txBody>
-      </p:sp>
     </p:spTree>
     <p:extLst>
       <p:ext uri="{BB962C8B-B14F-4D97-AF65-F5344CB8AC3E}">
-        <p14:creationId xmlns:p14="http://schemas.microsoft.com/office/powerpoint/2010/main" val="3182071835"/>
+        <p14:creationId xmlns:p14="http://schemas.microsoft.com/office/powerpoint/2010/main" val="3929874780"/>
       </p:ext>
     </p:extLst>
   </p:cSld>
@@ -6722,6 +6479,23 @@
 </file>
 
 <file path=customXml/item1.xml><?xml version="1.0" encoding="utf-8"?>
+<p:properties xmlns:p="http://schemas.microsoft.com/office/2006/metadata/properties" xmlns:xsi="http://www.w3.org/2001/XMLSchema-instance" xmlns:pc="http://schemas.microsoft.com/office/infopath/2007/PartnerControls">
+  <documentManagement>
+    <_activity xmlns="f1e5155a-4de1-4edf-b0c6-53134e0e5e81" xsi:nil="true"/>
+  </documentManagement>
+</p:properties>
+</file>
+
+<file path=customXml/item2.xml><?xml version="1.0" encoding="utf-8"?>
+<?mso-contentType ?>
+<FormTemplates xmlns="http://schemas.microsoft.com/sharepoint/v3/contenttype/forms">
+  <Display>DocumentLibraryForm</Display>
+  <Edit>DocumentLibraryForm</Edit>
+  <New>DocumentLibraryForm</New>
+</FormTemplates>
+</file>
+
+<file path=customXml/item3.xml><?xml version="1.0" encoding="utf-8"?>
 <ct:contentTypeSchema xmlns:ct="http://schemas.microsoft.com/office/2006/metadata/contentType" xmlns:ma="http://schemas.microsoft.com/office/2006/metadata/properties/metaAttributes" ct:_="" ma:_="" ma:contentTypeName="Document" ma:contentTypeID="0x01010098E9BA56E76D2447B6B33114ABBEA9D5" ma:contentTypeVersion="17" ma:contentTypeDescription="Create a new document." ma:contentTypeScope="" ma:versionID="eab5cebe44a9e109ecf62201a47214c6">
   <xsd:schema xmlns:xsd="http://www.w3.org/2001/XMLSchema" xmlns:xs="http://www.w3.org/2001/XMLSchema" xmlns:p="http://schemas.microsoft.com/office/2006/metadata/properties" xmlns:ns3="f1e5155a-4de1-4edf-b0c6-53134e0e5e81" xmlns:ns4="5b55b796-daa0-475c-b335-bbbb10b30c8e" targetNamespace="http://schemas.microsoft.com/office/2006/metadata/properties" ma:root="true" ma:fieldsID="dc852987dc368e0378459c8db44b5057" ns3:_="" ns4:_="">
     <xsd:import namespace="f1e5155a-4de1-4edf-b0c6-53134e0e5e81"/>
@@ -6968,24 +6742,32 @@
 </ct:contentTypeSchema>
 </file>
 
-<file path=customXml/item2.xml><?xml version="1.0" encoding="utf-8"?>
-<?mso-contentType ?>
-<FormTemplates xmlns="http://schemas.microsoft.com/sharepoint/v3/contenttype/forms">
-  <Display>DocumentLibraryForm</Display>
-  <Edit>DocumentLibraryForm</Edit>
-  <New>DocumentLibraryForm</New>
-</FormTemplates>
+<file path=customXml/itemProps1.xml><?xml version="1.0" encoding="utf-8"?>
+<ds:datastoreItem xmlns:ds="http://schemas.openxmlformats.org/officeDocument/2006/customXml" ds:itemID="{2ED8AE79-DE43-479A-A824-5F04350F9EC7}">
+  <ds:schemaRefs>
+    <ds:schemaRef ds:uri="5b55b796-daa0-475c-b335-bbbb10b30c8e"/>
+    <ds:schemaRef ds:uri="f1e5155a-4de1-4edf-b0c6-53134e0e5e81"/>
+    <ds:schemaRef ds:uri="http://purl.org/dc/dcmitype/"/>
+    <ds:schemaRef ds:uri="http://purl.org/dc/elements/1.1/"/>
+    <ds:schemaRef ds:uri="http://purl.org/dc/terms/"/>
+    <ds:schemaRef ds:uri="http://schemas.microsoft.com/office/2006/documentManagement/types"/>
+    <ds:schemaRef ds:uri="http://schemas.microsoft.com/office/2006/metadata/properties"/>
+    <ds:schemaRef ds:uri="http://schemas.microsoft.com/office/infopath/2007/PartnerControls"/>
+    <ds:schemaRef ds:uri="http://schemas.openxmlformats.org/package/2006/metadata/core-properties"/>
+    <ds:schemaRef ds:uri="http://www.w3.org/XML/1998/namespace"/>
+  </ds:schemaRefs>
+</ds:datastoreItem>
 </file>
 
-<file path=customXml/item3.xml><?xml version="1.0" encoding="utf-8"?>
-<p:properties xmlns:p="http://schemas.microsoft.com/office/2006/metadata/properties" xmlns:xsi="http://www.w3.org/2001/XMLSchema-instance" xmlns:pc="http://schemas.microsoft.com/office/infopath/2007/PartnerControls">
-  <documentManagement>
-    <_activity xmlns="f1e5155a-4de1-4edf-b0c6-53134e0e5e81" xsi:nil="true"/>
-  </documentManagement>
-</p:properties>
+<file path=customXml/itemProps2.xml><?xml version="1.0" encoding="utf-8"?>
+<ds:datastoreItem xmlns:ds="http://schemas.openxmlformats.org/officeDocument/2006/customXml" ds:itemID="{37500ECD-F1A1-4CA3-A5DC-2E37CCD17AB4}">
+  <ds:schemaRefs>
+    <ds:schemaRef ds:uri="http://schemas.microsoft.com/sharepoint/v3/contenttype/forms"/>
+  </ds:schemaRefs>
+</ds:datastoreItem>
 </file>
 
-<file path=customXml/itemProps1.xml><?xml version="1.0" encoding="utf-8"?>
+<file path=customXml/itemProps3.xml><?xml version="1.0" encoding="utf-8"?>
 <ds:datastoreItem xmlns:ds="http://schemas.openxmlformats.org/officeDocument/2006/customXml" ds:itemID="{AD731547-222C-4B6E-862E-4C4E35A78C01}">
   <ds:schemaRefs>
     <ds:schemaRef ds:uri="5b55b796-daa0-475c-b335-bbbb10b30c8e"/>
@@ -7002,29 +6784,4 @@
     <ds:schemaRef ds:uri="http://www.w3.org/2001/XMLSchema"/>
   </ds:schemaRefs>
 </ds:datastoreItem>
-</file>
-
-<file path=customXml/itemProps2.xml><?xml version="1.0" encoding="utf-8"?>
-<ds:datastoreItem xmlns:ds="http://schemas.openxmlformats.org/officeDocument/2006/customXml" ds:itemID="{37500ECD-F1A1-4CA3-A5DC-2E37CCD17AB4}">
-  <ds:schemaRefs>
-    <ds:schemaRef ds:uri="http://schemas.microsoft.com/sharepoint/v3/contenttype/forms"/>
-  </ds:schemaRefs>
-</ds:datastoreItem>
-</file>
-
-<file path=customXml/itemProps3.xml><?xml version="1.0" encoding="utf-8"?>
-<ds:datastoreItem xmlns:ds="http://schemas.openxmlformats.org/officeDocument/2006/customXml" ds:itemID="{2ED8AE79-DE43-479A-A824-5F04350F9EC7}">
-  <ds:schemaRefs>
-    <ds:schemaRef ds:uri="5b55b796-daa0-475c-b335-bbbb10b30c8e"/>
-    <ds:schemaRef ds:uri="f1e5155a-4de1-4edf-b0c6-53134e0e5e81"/>
-    <ds:schemaRef ds:uri="http://purl.org/dc/dcmitype/"/>
-    <ds:schemaRef ds:uri="http://purl.org/dc/elements/1.1/"/>
-    <ds:schemaRef ds:uri="http://purl.org/dc/terms/"/>
-    <ds:schemaRef ds:uri="http://schemas.microsoft.com/office/2006/documentManagement/types"/>
-    <ds:schemaRef ds:uri="http://schemas.microsoft.com/office/2006/metadata/properties"/>
-    <ds:schemaRef ds:uri="http://schemas.microsoft.com/office/infopath/2007/PartnerControls"/>
-    <ds:schemaRef ds:uri="http://schemas.openxmlformats.org/package/2006/metadata/core-properties"/>
-    <ds:schemaRef ds:uri="http://www.w3.org/XML/1998/namespace"/>
-  </ds:schemaRefs>
-</ds:datastoreItem>
 </file>
</xml_diff>

<commit_message>
Fixed Outdated Family Names
</commit_message>
<xml_diff>
--- a/app/www/CLIAR_template.pptx
+++ b/app/www/CLIAR_template.pptx
@@ -527,7 +527,7 @@
           <a:p>
             <a:fld id="{9EFFC45B-4969-4982-B259-08F17AE2E29E}" type="datetimeFigureOut">
               <a:rPr lang="en-US" smtClean="0"/>
-              <a:t>11/20/23</a:t>
+              <a:t>9/27/2024</a:t>
             </a:fld>
             <a:endParaRPr lang="en-US"/>
           </a:p>
@@ -3798,10 +3798,10 @@
       </p:sp>
       <p:pic>
         <p:nvPicPr>
-          <p:cNvPr id="6" name="Picture 5">
+          <p:cNvPr id="9" name="Picture 8" descr="A diagram of different types of information&#10;&#10;Description automatically generated with medium confidence">
             <a:extLst>
               <a:ext uri="{FF2B5EF4-FFF2-40B4-BE49-F238E27FC236}">
-                <a16:creationId xmlns:a16="http://schemas.microsoft.com/office/drawing/2014/main" id="{3B81A771-F787-B541-9533-7EE210EEAE52}"/>
+                <a16:creationId xmlns:a16="http://schemas.microsoft.com/office/drawing/2014/main" id="{40FE912B-E1ED-2F03-6BA4-CC80E1F56643}"/>
               </a:ext>
             </a:extLst>
           </p:cNvPr>
@@ -3810,27 +3810,26 @@
           </p:cNvPicPr>
           <p:nvPr/>
         </p:nvPicPr>
-        <p:blipFill rotWithShape="1">
-          <a:blip r:embed="rId3"/>
-          <a:srcRect l="484" r="2101" b="3448"/>
-          <a:stretch/>
+        <p:blipFill>
+          <a:blip r:embed="rId3">
+            <a:extLst>
+              <a:ext uri="{28A0092B-C50C-407E-A947-70E740481C1C}">
+                <a14:useLocalDpi xmlns:a14="http://schemas.microsoft.com/office/drawing/2010/main" val="0"/>
+              </a:ext>
+            </a:extLst>
+          </a:blip>
+          <a:stretch>
+            <a:fillRect/>
+          </a:stretch>
         </p:blipFill>
-        <p:spPr bwMode="auto">
+        <p:spPr>
           <a:xfrm>
-            <a:off x="7109863" y="752608"/>
-            <a:ext cx="4523337" cy="4830507"/>
+            <a:off x="6481904" y="916475"/>
+            <a:ext cx="5535396" cy="4666640"/>
           </a:xfrm>
           <a:prstGeom prst="rect">
             <a:avLst/>
           </a:prstGeom>
-          <a:ln>
-            <a:noFill/>
-          </a:ln>
-          <a:extLst>
-            <a:ext uri="{53640926-AAD7-44D8-BBD7-CCE9431645EC}">
-              <a14:shadowObscured xmlns:a14="http://schemas.microsoft.com/office/drawing/2010/main"/>
-            </a:ext>
-          </a:extLst>
         </p:spPr>
       </p:pic>
     </p:spTree>
@@ -6479,23 +6478,6 @@
 </file>
 
 <file path=customXml/item1.xml><?xml version="1.0" encoding="utf-8"?>
-<p:properties xmlns:p="http://schemas.microsoft.com/office/2006/metadata/properties" xmlns:xsi="http://www.w3.org/2001/XMLSchema-instance" xmlns:pc="http://schemas.microsoft.com/office/infopath/2007/PartnerControls">
-  <documentManagement>
-    <_activity xmlns="f1e5155a-4de1-4edf-b0c6-53134e0e5e81" xsi:nil="true"/>
-  </documentManagement>
-</p:properties>
-</file>
-
-<file path=customXml/item2.xml><?xml version="1.0" encoding="utf-8"?>
-<?mso-contentType ?>
-<FormTemplates xmlns="http://schemas.microsoft.com/sharepoint/v3/contenttype/forms">
-  <Display>DocumentLibraryForm</Display>
-  <Edit>DocumentLibraryForm</Edit>
-  <New>DocumentLibraryForm</New>
-</FormTemplates>
-</file>
-
-<file path=customXml/item3.xml><?xml version="1.0" encoding="utf-8"?>
 <ct:contentTypeSchema xmlns:ct="http://schemas.microsoft.com/office/2006/metadata/contentType" xmlns:ma="http://schemas.microsoft.com/office/2006/metadata/properties/metaAttributes" ct:_="" ma:_="" ma:contentTypeName="Document" ma:contentTypeID="0x01010098E9BA56E76D2447B6B33114ABBEA9D5" ma:contentTypeVersion="17" ma:contentTypeDescription="Create a new document." ma:contentTypeScope="" ma:versionID="eab5cebe44a9e109ecf62201a47214c6">
   <xsd:schema xmlns:xsd="http://www.w3.org/2001/XMLSchema" xmlns:xs="http://www.w3.org/2001/XMLSchema" xmlns:p="http://schemas.microsoft.com/office/2006/metadata/properties" xmlns:ns3="f1e5155a-4de1-4edf-b0c6-53134e0e5e81" xmlns:ns4="5b55b796-daa0-475c-b335-bbbb10b30c8e" targetNamespace="http://schemas.microsoft.com/office/2006/metadata/properties" ma:root="true" ma:fieldsID="dc852987dc368e0378459c8db44b5057" ns3:_="" ns4:_="">
     <xsd:import namespace="f1e5155a-4de1-4edf-b0c6-53134e0e5e81"/>
@@ -6742,32 +6724,24 @@
 </ct:contentTypeSchema>
 </file>
 
-<file path=customXml/itemProps1.xml><?xml version="1.0" encoding="utf-8"?>
-<ds:datastoreItem xmlns:ds="http://schemas.openxmlformats.org/officeDocument/2006/customXml" ds:itemID="{2ED8AE79-DE43-479A-A824-5F04350F9EC7}">
-  <ds:schemaRefs>
-    <ds:schemaRef ds:uri="5b55b796-daa0-475c-b335-bbbb10b30c8e"/>
-    <ds:schemaRef ds:uri="f1e5155a-4de1-4edf-b0c6-53134e0e5e81"/>
-    <ds:schemaRef ds:uri="http://purl.org/dc/dcmitype/"/>
-    <ds:schemaRef ds:uri="http://purl.org/dc/elements/1.1/"/>
-    <ds:schemaRef ds:uri="http://purl.org/dc/terms/"/>
-    <ds:schemaRef ds:uri="http://schemas.microsoft.com/office/2006/documentManagement/types"/>
-    <ds:schemaRef ds:uri="http://schemas.microsoft.com/office/2006/metadata/properties"/>
-    <ds:schemaRef ds:uri="http://schemas.microsoft.com/office/infopath/2007/PartnerControls"/>
-    <ds:schemaRef ds:uri="http://schemas.openxmlformats.org/package/2006/metadata/core-properties"/>
-    <ds:schemaRef ds:uri="http://www.w3.org/XML/1998/namespace"/>
-  </ds:schemaRefs>
-</ds:datastoreItem>
+<file path=customXml/item2.xml><?xml version="1.0" encoding="utf-8"?>
+<?mso-contentType ?>
+<FormTemplates xmlns="http://schemas.microsoft.com/sharepoint/v3/contenttype/forms">
+  <Display>DocumentLibraryForm</Display>
+  <Edit>DocumentLibraryForm</Edit>
+  <New>DocumentLibraryForm</New>
+</FormTemplates>
 </file>
 
-<file path=customXml/itemProps2.xml><?xml version="1.0" encoding="utf-8"?>
-<ds:datastoreItem xmlns:ds="http://schemas.openxmlformats.org/officeDocument/2006/customXml" ds:itemID="{37500ECD-F1A1-4CA3-A5DC-2E37CCD17AB4}">
-  <ds:schemaRefs>
-    <ds:schemaRef ds:uri="http://schemas.microsoft.com/sharepoint/v3/contenttype/forms"/>
-  </ds:schemaRefs>
-</ds:datastoreItem>
+<file path=customXml/item3.xml><?xml version="1.0" encoding="utf-8"?>
+<p:properties xmlns:p="http://schemas.microsoft.com/office/2006/metadata/properties" xmlns:xsi="http://www.w3.org/2001/XMLSchema-instance" xmlns:pc="http://schemas.microsoft.com/office/infopath/2007/PartnerControls">
+  <documentManagement>
+    <_activity xmlns="f1e5155a-4de1-4edf-b0c6-53134e0e5e81" xsi:nil="true"/>
+  </documentManagement>
+</p:properties>
 </file>
 
-<file path=customXml/itemProps3.xml><?xml version="1.0" encoding="utf-8"?>
+<file path=customXml/itemProps1.xml><?xml version="1.0" encoding="utf-8"?>
 <ds:datastoreItem xmlns:ds="http://schemas.openxmlformats.org/officeDocument/2006/customXml" ds:itemID="{AD731547-222C-4B6E-862E-4C4E35A78C01}">
   <ds:schemaRefs>
     <ds:schemaRef ds:uri="5b55b796-daa0-475c-b335-bbbb10b30c8e"/>
@@ -6784,4 +6758,29 @@
     <ds:schemaRef ds:uri="http://www.w3.org/2001/XMLSchema"/>
   </ds:schemaRefs>
 </ds:datastoreItem>
+</file>
+
+<file path=customXml/itemProps2.xml><?xml version="1.0" encoding="utf-8"?>
+<ds:datastoreItem xmlns:ds="http://schemas.openxmlformats.org/officeDocument/2006/customXml" ds:itemID="{37500ECD-F1A1-4CA3-A5DC-2E37CCD17AB4}">
+  <ds:schemaRefs>
+    <ds:schemaRef ds:uri="http://schemas.microsoft.com/sharepoint/v3/contenttype/forms"/>
+  </ds:schemaRefs>
+</ds:datastoreItem>
+</file>
+
+<file path=customXml/itemProps3.xml><?xml version="1.0" encoding="utf-8"?>
+<ds:datastoreItem xmlns:ds="http://schemas.openxmlformats.org/officeDocument/2006/customXml" ds:itemID="{2ED8AE79-DE43-479A-A824-5F04350F9EC7}">
+  <ds:schemaRefs>
+    <ds:schemaRef ds:uri="5b55b796-daa0-475c-b335-bbbb10b30c8e"/>
+    <ds:schemaRef ds:uri="f1e5155a-4de1-4edf-b0c6-53134e0e5e81"/>
+    <ds:schemaRef ds:uri="http://purl.org/dc/dcmitype/"/>
+    <ds:schemaRef ds:uri="http://purl.org/dc/elements/1.1/"/>
+    <ds:schemaRef ds:uri="http://purl.org/dc/terms/"/>
+    <ds:schemaRef ds:uri="http://schemas.microsoft.com/office/2006/documentManagement/types"/>
+    <ds:schemaRef ds:uri="http://schemas.microsoft.com/office/2006/metadata/properties"/>
+    <ds:schemaRef ds:uri="http://schemas.microsoft.com/office/infopath/2007/PartnerControls"/>
+    <ds:schemaRef ds:uri="http://schemas.openxmlformats.org/package/2006/metadata/core-properties"/>
+    <ds:schemaRef ds:uri="http://www.w3.org/XML/1998/namespace"/>
+  </ds:schemaRefs>
+</ds:datastoreItem>
 </file>
</xml_diff>

<commit_message>
Added proper files for new report
</commit_message>
<xml_diff>
--- a/app/www/CLIAR_template.pptx
+++ b/app/www/CLIAR_template.pptx
@@ -527,7 +527,7 @@
           <a:p>
             <a:fld id="{9EFFC45B-4969-4982-B259-08F17AE2E29E}" type="datetimeFigureOut">
               <a:rPr lang="en-US" smtClean="0"/>
-              <a:t>11/20/23</a:t>
+              <a:t>9/27/2024</a:t>
             </a:fld>
             <a:endParaRPr lang="en-US"/>
           </a:p>
@@ -3798,10 +3798,10 @@
       </p:sp>
       <p:pic>
         <p:nvPicPr>
-          <p:cNvPr id="6" name="Picture 5">
+          <p:cNvPr id="9" name="Picture 8" descr="A diagram of different types of information&#10;&#10;Description automatically generated with medium confidence">
             <a:extLst>
               <a:ext uri="{FF2B5EF4-FFF2-40B4-BE49-F238E27FC236}">
-                <a16:creationId xmlns:a16="http://schemas.microsoft.com/office/drawing/2014/main" id="{3B81A771-F787-B541-9533-7EE210EEAE52}"/>
+                <a16:creationId xmlns:a16="http://schemas.microsoft.com/office/drawing/2014/main" id="{40FE912B-E1ED-2F03-6BA4-CC80E1F56643}"/>
               </a:ext>
             </a:extLst>
           </p:cNvPr>
@@ -3810,27 +3810,26 @@
           </p:cNvPicPr>
           <p:nvPr/>
         </p:nvPicPr>
-        <p:blipFill rotWithShape="1">
-          <a:blip r:embed="rId3"/>
-          <a:srcRect l="484" r="2101" b="3448"/>
-          <a:stretch/>
+        <p:blipFill>
+          <a:blip r:embed="rId3">
+            <a:extLst>
+              <a:ext uri="{28A0092B-C50C-407E-A947-70E740481C1C}">
+                <a14:useLocalDpi xmlns:a14="http://schemas.microsoft.com/office/drawing/2010/main" val="0"/>
+              </a:ext>
+            </a:extLst>
+          </a:blip>
+          <a:stretch>
+            <a:fillRect/>
+          </a:stretch>
         </p:blipFill>
-        <p:spPr bwMode="auto">
+        <p:spPr>
           <a:xfrm>
-            <a:off x="7109863" y="752608"/>
-            <a:ext cx="4523337" cy="4830507"/>
+            <a:off x="6481904" y="916475"/>
+            <a:ext cx="5535396" cy="4666640"/>
           </a:xfrm>
           <a:prstGeom prst="rect">
             <a:avLst/>
           </a:prstGeom>
-          <a:ln>
-            <a:noFill/>
-          </a:ln>
-          <a:extLst>
-            <a:ext uri="{53640926-AAD7-44D8-BBD7-CCE9431645EC}">
-              <a14:shadowObscured xmlns:a14="http://schemas.microsoft.com/office/drawing/2010/main"/>
-            </a:ext>
-          </a:extLst>
         </p:spPr>
       </p:pic>
     </p:spTree>
@@ -6479,23 +6478,6 @@
 </file>
 
 <file path=customXml/item1.xml><?xml version="1.0" encoding="utf-8"?>
-<p:properties xmlns:p="http://schemas.microsoft.com/office/2006/metadata/properties" xmlns:xsi="http://www.w3.org/2001/XMLSchema-instance" xmlns:pc="http://schemas.microsoft.com/office/infopath/2007/PartnerControls">
-  <documentManagement>
-    <_activity xmlns="f1e5155a-4de1-4edf-b0c6-53134e0e5e81" xsi:nil="true"/>
-  </documentManagement>
-</p:properties>
-</file>
-
-<file path=customXml/item2.xml><?xml version="1.0" encoding="utf-8"?>
-<?mso-contentType ?>
-<FormTemplates xmlns="http://schemas.microsoft.com/sharepoint/v3/contenttype/forms">
-  <Display>DocumentLibraryForm</Display>
-  <Edit>DocumentLibraryForm</Edit>
-  <New>DocumentLibraryForm</New>
-</FormTemplates>
-</file>
-
-<file path=customXml/item3.xml><?xml version="1.0" encoding="utf-8"?>
 <ct:contentTypeSchema xmlns:ct="http://schemas.microsoft.com/office/2006/metadata/contentType" xmlns:ma="http://schemas.microsoft.com/office/2006/metadata/properties/metaAttributes" ct:_="" ma:_="" ma:contentTypeName="Document" ma:contentTypeID="0x01010098E9BA56E76D2447B6B33114ABBEA9D5" ma:contentTypeVersion="17" ma:contentTypeDescription="Create a new document." ma:contentTypeScope="" ma:versionID="eab5cebe44a9e109ecf62201a47214c6">
   <xsd:schema xmlns:xsd="http://www.w3.org/2001/XMLSchema" xmlns:xs="http://www.w3.org/2001/XMLSchema" xmlns:p="http://schemas.microsoft.com/office/2006/metadata/properties" xmlns:ns3="f1e5155a-4de1-4edf-b0c6-53134e0e5e81" xmlns:ns4="5b55b796-daa0-475c-b335-bbbb10b30c8e" targetNamespace="http://schemas.microsoft.com/office/2006/metadata/properties" ma:root="true" ma:fieldsID="dc852987dc368e0378459c8db44b5057" ns3:_="" ns4:_="">
     <xsd:import namespace="f1e5155a-4de1-4edf-b0c6-53134e0e5e81"/>
@@ -6742,32 +6724,24 @@
 </ct:contentTypeSchema>
 </file>
 
-<file path=customXml/itemProps1.xml><?xml version="1.0" encoding="utf-8"?>
-<ds:datastoreItem xmlns:ds="http://schemas.openxmlformats.org/officeDocument/2006/customXml" ds:itemID="{2ED8AE79-DE43-479A-A824-5F04350F9EC7}">
-  <ds:schemaRefs>
-    <ds:schemaRef ds:uri="5b55b796-daa0-475c-b335-bbbb10b30c8e"/>
-    <ds:schemaRef ds:uri="f1e5155a-4de1-4edf-b0c6-53134e0e5e81"/>
-    <ds:schemaRef ds:uri="http://purl.org/dc/dcmitype/"/>
-    <ds:schemaRef ds:uri="http://purl.org/dc/elements/1.1/"/>
-    <ds:schemaRef ds:uri="http://purl.org/dc/terms/"/>
-    <ds:schemaRef ds:uri="http://schemas.microsoft.com/office/2006/documentManagement/types"/>
-    <ds:schemaRef ds:uri="http://schemas.microsoft.com/office/2006/metadata/properties"/>
-    <ds:schemaRef ds:uri="http://schemas.microsoft.com/office/infopath/2007/PartnerControls"/>
-    <ds:schemaRef ds:uri="http://schemas.openxmlformats.org/package/2006/metadata/core-properties"/>
-    <ds:schemaRef ds:uri="http://www.w3.org/XML/1998/namespace"/>
-  </ds:schemaRefs>
-</ds:datastoreItem>
+<file path=customXml/item2.xml><?xml version="1.0" encoding="utf-8"?>
+<?mso-contentType ?>
+<FormTemplates xmlns="http://schemas.microsoft.com/sharepoint/v3/contenttype/forms">
+  <Display>DocumentLibraryForm</Display>
+  <Edit>DocumentLibraryForm</Edit>
+  <New>DocumentLibraryForm</New>
+</FormTemplates>
 </file>
 
-<file path=customXml/itemProps2.xml><?xml version="1.0" encoding="utf-8"?>
-<ds:datastoreItem xmlns:ds="http://schemas.openxmlformats.org/officeDocument/2006/customXml" ds:itemID="{37500ECD-F1A1-4CA3-A5DC-2E37CCD17AB4}">
-  <ds:schemaRefs>
-    <ds:schemaRef ds:uri="http://schemas.microsoft.com/sharepoint/v3/contenttype/forms"/>
-  </ds:schemaRefs>
-</ds:datastoreItem>
+<file path=customXml/item3.xml><?xml version="1.0" encoding="utf-8"?>
+<p:properties xmlns:p="http://schemas.microsoft.com/office/2006/metadata/properties" xmlns:xsi="http://www.w3.org/2001/XMLSchema-instance" xmlns:pc="http://schemas.microsoft.com/office/infopath/2007/PartnerControls">
+  <documentManagement>
+    <_activity xmlns="f1e5155a-4de1-4edf-b0c6-53134e0e5e81" xsi:nil="true"/>
+  </documentManagement>
+</p:properties>
 </file>
 
-<file path=customXml/itemProps3.xml><?xml version="1.0" encoding="utf-8"?>
+<file path=customXml/itemProps1.xml><?xml version="1.0" encoding="utf-8"?>
 <ds:datastoreItem xmlns:ds="http://schemas.openxmlformats.org/officeDocument/2006/customXml" ds:itemID="{AD731547-222C-4B6E-862E-4C4E35A78C01}">
   <ds:schemaRefs>
     <ds:schemaRef ds:uri="5b55b796-daa0-475c-b335-bbbb10b30c8e"/>
@@ -6784,4 +6758,29 @@
     <ds:schemaRef ds:uri="http://www.w3.org/2001/XMLSchema"/>
   </ds:schemaRefs>
 </ds:datastoreItem>
+</file>
+
+<file path=customXml/itemProps2.xml><?xml version="1.0" encoding="utf-8"?>
+<ds:datastoreItem xmlns:ds="http://schemas.openxmlformats.org/officeDocument/2006/customXml" ds:itemID="{37500ECD-F1A1-4CA3-A5DC-2E37CCD17AB4}">
+  <ds:schemaRefs>
+    <ds:schemaRef ds:uri="http://schemas.microsoft.com/sharepoint/v3/contenttype/forms"/>
+  </ds:schemaRefs>
+</ds:datastoreItem>
+</file>
+
+<file path=customXml/itemProps3.xml><?xml version="1.0" encoding="utf-8"?>
+<ds:datastoreItem xmlns:ds="http://schemas.openxmlformats.org/officeDocument/2006/customXml" ds:itemID="{2ED8AE79-DE43-479A-A824-5F04350F9EC7}">
+  <ds:schemaRefs>
+    <ds:schemaRef ds:uri="5b55b796-daa0-475c-b335-bbbb10b30c8e"/>
+    <ds:schemaRef ds:uri="f1e5155a-4de1-4edf-b0c6-53134e0e5e81"/>
+    <ds:schemaRef ds:uri="http://purl.org/dc/dcmitype/"/>
+    <ds:schemaRef ds:uri="http://purl.org/dc/elements/1.1/"/>
+    <ds:schemaRef ds:uri="http://purl.org/dc/terms/"/>
+    <ds:schemaRef ds:uri="http://schemas.microsoft.com/office/2006/documentManagement/types"/>
+    <ds:schemaRef ds:uri="http://schemas.microsoft.com/office/2006/metadata/properties"/>
+    <ds:schemaRef ds:uri="http://schemas.microsoft.com/office/infopath/2007/PartnerControls"/>
+    <ds:schemaRef ds:uri="http://schemas.openxmlformats.org/package/2006/metadata/core-properties"/>
+    <ds:schemaRef ds:uri="http://www.w3.org/XML/1998/namespace"/>
+  </ds:schemaRefs>
+</ds:datastoreItem>
 </file>
</xml_diff>